<commit_message>
started to refine proposal
</commit_message>
<xml_diff>
--- a/PRIME/2024/PRIME_experiments.pptx
+++ b/PRIME/2024/PRIME_experiments.pptx
@@ -206,7 +206,7 @@
           <a:p>
             <a:fld id="{B061A044-314D-4329-9682-F6176F300576}" type="datetimeFigureOut">
               <a:rPr lang="en-US" smtClean="0"/>
-              <a:t>11/2/2024</a:t>
+              <a:t>7/15/2025</a:t>
             </a:fld>
             <a:endParaRPr lang="en-US"/>
           </a:p>
@@ -960,7 +960,7 @@
           <a:p>
             <a:fld id="{7733AE6D-9644-4FC2-AE05-59B9DC610BB8}" type="datetimeFigureOut">
               <a:rPr lang="en-US" smtClean="0"/>
-              <a:t>11/2/2024</a:t>
+              <a:t>7/15/2025</a:t>
             </a:fld>
             <a:endParaRPr lang="en-US"/>
           </a:p>
@@ -1160,7 +1160,7 @@
           <a:p>
             <a:fld id="{7733AE6D-9644-4FC2-AE05-59B9DC610BB8}" type="datetimeFigureOut">
               <a:rPr lang="en-US" smtClean="0"/>
-              <a:t>11/2/2024</a:t>
+              <a:t>7/15/2025</a:t>
             </a:fld>
             <a:endParaRPr lang="en-US"/>
           </a:p>
@@ -1370,7 +1370,7 @@
           <a:p>
             <a:fld id="{7733AE6D-9644-4FC2-AE05-59B9DC610BB8}" type="datetimeFigureOut">
               <a:rPr lang="en-US" smtClean="0"/>
-              <a:t>11/2/2024</a:t>
+              <a:t>7/15/2025</a:t>
             </a:fld>
             <a:endParaRPr lang="en-US"/>
           </a:p>
@@ -1570,7 +1570,7 @@
           <a:p>
             <a:fld id="{7733AE6D-9644-4FC2-AE05-59B9DC610BB8}" type="datetimeFigureOut">
               <a:rPr lang="en-US" smtClean="0"/>
-              <a:t>11/2/2024</a:t>
+              <a:t>7/15/2025</a:t>
             </a:fld>
             <a:endParaRPr lang="en-US"/>
           </a:p>
@@ -1846,7 +1846,7 @@
           <a:p>
             <a:fld id="{7733AE6D-9644-4FC2-AE05-59B9DC610BB8}" type="datetimeFigureOut">
               <a:rPr lang="en-US" smtClean="0"/>
-              <a:t>11/2/2024</a:t>
+              <a:t>7/15/2025</a:t>
             </a:fld>
             <a:endParaRPr lang="en-US"/>
           </a:p>
@@ -2114,7 +2114,7 @@
           <a:p>
             <a:fld id="{7733AE6D-9644-4FC2-AE05-59B9DC610BB8}" type="datetimeFigureOut">
               <a:rPr lang="en-US" smtClean="0"/>
-              <a:t>11/2/2024</a:t>
+              <a:t>7/15/2025</a:t>
             </a:fld>
             <a:endParaRPr lang="en-US"/>
           </a:p>
@@ -2529,7 +2529,7 @@
           <a:p>
             <a:fld id="{7733AE6D-9644-4FC2-AE05-59B9DC610BB8}" type="datetimeFigureOut">
               <a:rPr lang="en-US" smtClean="0"/>
-              <a:t>11/2/2024</a:t>
+              <a:t>7/15/2025</a:t>
             </a:fld>
             <a:endParaRPr lang="en-US"/>
           </a:p>
@@ -2671,7 +2671,7 @@
           <a:p>
             <a:fld id="{7733AE6D-9644-4FC2-AE05-59B9DC610BB8}" type="datetimeFigureOut">
               <a:rPr lang="en-US" smtClean="0"/>
-              <a:t>11/2/2024</a:t>
+              <a:t>7/15/2025</a:t>
             </a:fld>
             <a:endParaRPr lang="en-US"/>
           </a:p>
@@ -2784,7 +2784,7 @@
           <a:p>
             <a:fld id="{7733AE6D-9644-4FC2-AE05-59B9DC610BB8}" type="datetimeFigureOut">
               <a:rPr lang="en-US" smtClean="0"/>
-              <a:t>11/2/2024</a:t>
+              <a:t>7/15/2025</a:t>
             </a:fld>
             <a:endParaRPr lang="en-US"/>
           </a:p>
@@ -3097,7 +3097,7 @@
           <a:p>
             <a:fld id="{7733AE6D-9644-4FC2-AE05-59B9DC610BB8}" type="datetimeFigureOut">
               <a:rPr lang="en-US" smtClean="0"/>
-              <a:t>11/2/2024</a:t>
+              <a:t>7/15/2025</a:t>
             </a:fld>
             <a:endParaRPr lang="en-US"/>
           </a:p>
@@ -3386,7 +3386,7 @@
           <a:p>
             <a:fld id="{7733AE6D-9644-4FC2-AE05-59B9DC610BB8}" type="datetimeFigureOut">
               <a:rPr lang="en-US" smtClean="0"/>
-              <a:t>11/2/2024</a:t>
+              <a:t>7/15/2025</a:t>
             </a:fld>
             <a:endParaRPr lang="en-US"/>
           </a:p>
@@ -3629,7 +3629,7 @@
           <a:p>
             <a:fld id="{7733AE6D-9644-4FC2-AE05-59B9DC610BB8}" type="datetimeFigureOut">
               <a:rPr lang="en-US" smtClean="0"/>
-              <a:t>11/2/2024</a:t>
+              <a:t>7/15/2025</a:t>
             </a:fld>
             <a:endParaRPr lang="en-US"/>
           </a:p>

</xml_diff>